<commit_message>
adjust for the last class to match learning speed
</commit_message>
<xml_diff>
--- a/lessons/Feb10/Class3A_polarity.pptx
+++ b/lessons/Feb10/Class3A_polarity.pptx
@@ -1278,7 +1278,7 @@
           <a:p>
             <a:fld id="{B0C0A60C-850A-4EA4-9C14-A8FE98B94505}" type="datetimeFigureOut">
               <a:rPr lang="en-US" smtClean="0"/>
-              <a:t>1/30/23</a:t>
+              <a:t>2/8/23</a:t>
             </a:fld>
             <a:endParaRPr lang="en-US"/>
           </a:p>
@@ -1677,7 +1677,7 @@
           <a:p>
             <a:fld id="{5738B90E-0779-4C36-915C-6F05FCD89456}" type="datetime1">
               <a:rPr lang="en-US" smtClean="0"/>
-              <a:t>1/30/23</a:t>
+              <a:t>2/8/23</a:t>
             </a:fld>
             <a:endParaRPr lang="en-US"/>
           </a:p>
@@ -1874,7 +1874,7 @@
           <a:p>
             <a:fld id="{7B9EA29D-D431-42FE-B7B6-AAE4454C77D3}" type="datetime1">
               <a:rPr lang="en-US" smtClean="0"/>
-              <a:t>1/30/23</a:t>
+              <a:t>2/8/23</a:t>
             </a:fld>
             <a:endParaRPr lang="en-US"/>
           </a:p>
@@ -2229,7 +2229,7 @@
           <a:p>
             <a:fld id="{690D8A1E-EA8F-46C1-B891-AE0C00D9C314}" type="datetime1">
               <a:rPr lang="en-US" smtClean="0"/>
-              <a:t>1/30/23</a:t>
+              <a:t>2/8/23</a:t>
             </a:fld>
             <a:endParaRPr lang="en-US"/>
           </a:p>
@@ -2537,7 +2537,7 @@
           <a:p>
             <a:fld id="{D753EFC8-4232-4598-94F6-94C0EBAFC469}" type="datetime1">
               <a:rPr lang="en-US" smtClean="0"/>
-              <a:t>1/30/23</a:t>
+              <a:t>2/8/23</a:t>
             </a:fld>
             <a:endParaRPr lang="en-US"/>
           </a:p>
@@ -2866,7 +2866,7 @@
           <a:p>
             <a:fld id="{F3161074-1C18-4AE7-957D-F18524378C85}" type="datetime1">
               <a:rPr lang="en-US" smtClean="0"/>
-              <a:t>1/30/23</a:t>
+              <a:t>2/8/23</a:t>
             </a:fld>
             <a:endParaRPr lang="en-US"/>
           </a:p>
@@ -3119,7 +3119,7 @@
           <a:p>
             <a:fld id="{69BE256C-8D9A-4404-B47D-41A1AE514425}" type="datetime1">
               <a:rPr lang="en-US" smtClean="0"/>
-              <a:t>1/30/23</a:t>
+              <a:t>2/8/23</a:t>
             </a:fld>
             <a:endParaRPr lang="en-US"/>
           </a:p>
@@ -3567,7 +3567,7 @@
           <a:p>
             <a:fld id="{66CB2154-9035-4012-8189-BAAB61C5A5EE}" type="datetime1">
               <a:rPr lang="en-US" smtClean="0"/>
-              <a:t>1/30/23</a:t>
+              <a:t>2/8/23</a:t>
             </a:fld>
             <a:endParaRPr lang="en-US"/>
           </a:p>
@@ -3755,7 +3755,7 @@
           <a:p>
             <a:fld id="{6700A58B-DD98-43D0-B791-721480A02982}" type="datetime1">
               <a:rPr lang="en-US" smtClean="0"/>
-              <a:t>1/30/23</a:t>
+              <a:t>2/8/23</a:t>
             </a:fld>
             <a:endParaRPr lang="en-US"/>
           </a:p>
@@ -3961,7 +3961,7 @@
           <a:p>
             <a:fld id="{7DB6E382-4F61-4E24-BE1A-377EC83D0E3A}" type="datetime1">
               <a:rPr lang="en-US" smtClean="0"/>
-              <a:t>1/30/23</a:t>
+              <a:t>2/8/23</a:t>
             </a:fld>
             <a:endParaRPr lang="en-US"/>
           </a:p>
@@ -4367,7 +4367,7 @@
           <a:p>
             <a:fld id="{4142EED6-FC16-45B9-B8C4-2BC5DBA88325}" type="datetime1">
               <a:rPr lang="en-US" smtClean="0"/>
-              <a:t>1/30/23</a:t>
+              <a:t>2/8/23</a:t>
             </a:fld>
             <a:endParaRPr lang="en-US"/>
           </a:p>
@@ -4699,7 +4699,7 @@
           <a:p>
             <a:fld id="{DF59512B-4F1D-43D7-8819-2F53FEF69650}" type="datetime1">
               <a:rPr lang="en-US" smtClean="0"/>
-              <a:t>1/30/23</a:t>
+              <a:t>2/8/23</a:t>
             </a:fld>
             <a:endParaRPr lang="en-US"/>
           </a:p>
@@ -4989,7 +4989,7 @@
           <a:p>
             <a:fld id="{08437B94-E2BF-44DC-ADC5-B05FC9934E9D}" type="datetime1">
               <a:rPr lang="en-US" smtClean="0"/>
-              <a:t>1/30/23</a:t>
+              <a:t>2/8/23</a:t>
             </a:fld>
             <a:endParaRPr lang="en-US"/>
           </a:p>
@@ -5478,7 +5478,7 @@
             <a:fld id="{5738B90E-0779-4C36-915C-6F05FCD89456}" type="datetime1">
               <a:rPr lang="en-US" smtClean="0"/>
               <a:pPr/>
-              <a:t>1/30/23</a:t>
+              <a:t>2/8/23</a:t>
             </a:fld>
             <a:endParaRPr lang="en-US"/>
           </a:p>
@@ -5664,7 +5664,7 @@
           <a:p>
             <a:fld id="{6700A58B-DD98-43D0-B791-721480A02982}" type="datetime1">
               <a:rPr lang="en-US" smtClean="0"/>
-              <a:t>1/30/23</a:t>
+              <a:t>2/8/23</a:t>
             </a:fld>
             <a:endParaRPr lang="en-US"/>
           </a:p>
@@ -6073,7 +6073,7 @@
           <a:p>
             <a:fld id="{6700A58B-DD98-43D0-B791-721480A02982}" type="datetime1">
               <a:rPr lang="en-US" smtClean="0"/>
-              <a:t>1/30/23</a:t>
+              <a:t>2/8/23</a:t>
             </a:fld>
             <a:endParaRPr lang="en-US"/>
           </a:p>
@@ -6382,7 +6382,7 @@
                 <a:ea typeface="Arial Unicode MS" panose="020B0604020202020204" pitchFamily="34" charset="-128"/>
                 <a:cs typeface="Arial Unicode MS" panose="020B0604020202020204" pitchFamily="34" charset="-128"/>
               </a:rPr>
-              <a:t>) # same methodology as </a:t>
+              <a:t>) # similar to </a:t>
             </a:r>
             <a:r>
               <a:rPr lang="en-US" dirty="0" err="1">
@@ -6797,7 +6797,7 @@
           <a:p>
             <a:fld id="{6700A58B-DD98-43D0-B791-721480A02982}" type="datetime1">
               <a:rPr lang="en-US" smtClean="0"/>
-              <a:t>1/30/23</a:t>
+              <a:t>2/8/23</a:t>
             </a:fld>
             <a:endParaRPr lang="en-US"/>
           </a:p>
@@ -7203,7 +7203,7 @@
           <a:p>
             <a:fld id="{6700A58B-DD98-43D0-B791-721480A02982}" type="datetime1">
               <a:rPr lang="en-US" smtClean="0"/>
-              <a:t>1/30/23</a:t>
+              <a:t>2/8/23</a:t>
             </a:fld>
             <a:endParaRPr lang="en-US"/>
           </a:p>
@@ -8307,7 +8307,7 @@
           <a:p>
             <a:fld id="{D753EFC8-4232-4598-94F6-94C0EBAFC469}" type="datetime1">
               <a:rPr lang="en-US" smtClean="0"/>
-              <a:t>1/30/23</a:t>
+              <a:t>2/8/23</a:t>
             </a:fld>
             <a:endParaRPr lang="en-US"/>
           </a:p>
@@ -8473,7 +8473,7 @@
             <a:fld id="{6700A58B-DD98-43D0-B791-721480A02982}" type="datetime1">
               <a:rPr lang="en-US" smtClean="0"/>
               <a:pPr/>
-              <a:t>1/30/23</a:t>
+              <a:t>2/8/23</a:t>
             </a:fld>
             <a:endParaRPr lang="en-US"/>
           </a:p>
@@ -8830,7 +8830,7 @@
           <a:p>
             <a:fld id="{6700A58B-DD98-43D0-B791-721480A02982}" type="datetime1">
               <a:rPr lang="en-US" smtClean="0"/>
-              <a:t>1/30/23</a:t>
+              <a:t>2/8/23</a:t>
             </a:fld>
             <a:endParaRPr lang="en-US"/>
           </a:p>
@@ -9228,7 +9228,7 @@
             <a:fld id="{6700A58B-DD98-43D0-B791-721480A02982}" type="datetime1">
               <a:rPr lang="en-US" smtClean="0"/>
               <a:pPr/>
-              <a:t>1/30/23</a:t>
+              <a:t>2/8/23</a:t>
             </a:fld>
             <a:endParaRPr lang="en-US"/>
           </a:p>
@@ -9593,7 +9593,7 @@
           <a:p>
             <a:fld id="{6700A58B-DD98-43D0-B791-721480A02982}" type="datetime1">
               <a:rPr lang="en-US" smtClean="0"/>
-              <a:t>1/30/23</a:t>
+              <a:t>2/8/23</a:t>
             </a:fld>
             <a:endParaRPr lang="en-US"/>
           </a:p>
@@ -9848,7 +9848,7 @@
           <a:p>
             <a:fld id="{6700A58B-DD98-43D0-B791-721480A02982}" type="datetime1">
               <a:rPr lang="en-US" smtClean="0"/>
-              <a:t>1/30/23</a:t>
+              <a:t>2/8/23</a:t>
             </a:fld>
             <a:endParaRPr lang="en-US"/>
           </a:p>
@@ -9959,7 +9959,7 @@
             </a:pPr>
             <a:r>
               <a:rPr lang="en-US" sz="4400" dirty="0"/>
-              <a:t>I loathe Aldi.</a:t>
+              <a:t>I loathe Duke.</a:t>
             </a:r>
           </a:p>
         </p:txBody>
@@ -10379,7 +10379,7 @@
           <a:p>
             <a:fld id="{6700A58B-DD98-43D0-B791-721480A02982}" type="datetime1">
               <a:rPr lang="en-US" smtClean="0"/>
-              <a:t>1/30/23</a:t>
+              <a:t>2/8/23</a:t>
             </a:fld>
             <a:endParaRPr lang="en-US"/>
           </a:p>
@@ -10490,7 +10490,7 @@
             </a:pPr>
             <a:r>
               <a:rPr lang="en-US" sz="4400" dirty="0"/>
-              <a:t>I love Carrefour. They are the best.</a:t>
+              <a:t>I love UNC. They are the best.</a:t>
             </a:r>
           </a:p>
         </p:txBody>
@@ -10551,7 +10551,7 @@
         </p:nvCxnSpPr>
         <p:spPr>
           <a:xfrm>
-            <a:off x="7752521" y="2179982"/>
+            <a:off x="6690208" y="2179982"/>
             <a:ext cx="0" cy="503582"/>
           </a:xfrm>
           <a:prstGeom prst="straightConnector1">
@@ -10631,7 +10631,7 @@
         </p:nvSpPr>
         <p:spPr>
           <a:xfrm>
-            <a:off x="7153228" y="2532030"/>
+            <a:off x="6077468" y="2532030"/>
             <a:ext cx="1165768" cy="769441"/>
           </a:xfrm>
           <a:prstGeom prst="rect">
@@ -10651,61 +10651,6 @@
                 </a:solidFill>
               </a:rPr>
               <a:t>best</a:t>
-            </a:r>
-          </a:p>
-        </p:txBody>
-      </p:sp>
-      <p:sp>
-        <p:nvSpPr>
-          <p:cNvPr id="11" name="Rectangle 10">
-            <a:extLst>
-              <a:ext uri="{FF2B5EF4-FFF2-40B4-BE49-F238E27FC236}">
-                <a16:creationId xmlns:a16="http://schemas.microsoft.com/office/drawing/2014/main" id="{B4B9E460-C4D0-FB42-B76F-4C9131F65344}"/>
-              </a:ext>
-            </a:extLst>
-          </p:cNvPr>
-          <p:cNvSpPr/>
-          <p:nvPr/>
-        </p:nvSpPr>
-        <p:spPr>
-          <a:xfrm>
-            <a:off x="4138448" y="3374506"/>
-            <a:ext cx="867104" cy="677918"/>
-          </a:xfrm>
-          <a:prstGeom prst="rect">
-            <a:avLst/>
-          </a:prstGeom>
-          <a:solidFill>
-            <a:srgbClr val="00B050"/>
-          </a:solidFill>
-          <a:ln>
-            <a:noFill/>
-          </a:ln>
-        </p:spPr>
-        <p:style>
-          <a:lnRef idx="2">
-            <a:schemeClr val="accent1">
-              <a:shade val="50000"/>
-            </a:schemeClr>
-          </a:lnRef>
-          <a:fillRef idx="1">
-            <a:schemeClr val="accent1"/>
-          </a:fillRef>
-          <a:effectRef idx="0">
-            <a:schemeClr val="accent1"/>
-          </a:effectRef>
-          <a:fontRef idx="minor">
-            <a:schemeClr val="lt1"/>
-          </a:fontRef>
-        </p:style>
-        <p:txBody>
-          <a:bodyPr rtlCol="0" anchor="ctr"/>
-          <a:lstStyle/>
-          <a:p>
-            <a:pPr algn="ctr"/>
-            <a:r>
-              <a:rPr lang="en-US" sz="3200" dirty="0"/>
-              <a:t>+2</a:t>
             </a:r>
           </a:p>
         </p:txBody>
@@ -10772,7 +10717,7 @@
         </p:nvCxnSpPr>
         <p:spPr>
           <a:xfrm rot="5400000">
-            <a:off x="6188027" y="2189028"/>
+            <a:off x="5112267" y="2189028"/>
             <a:ext cx="435643" cy="2660528"/>
           </a:xfrm>
           <a:prstGeom prst="bentConnector2">
@@ -10886,6 +10831,61 @@
           </a:fontRef>
         </p:style>
       </p:cxnSp>
+      <p:sp>
+        <p:nvSpPr>
+          <p:cNvPr id="11" name="Rectangle 10">
+            <a:extLst>
+              <a:ext uri="{FF2B5EF4-FFF2-40B4-BE49-F238E27FC236}">
+                <a16:creationId xmlns:a16="http://schemas.microsoft.com/office/drawing/2014/main" id="{B4B9E460-C4D0-FB42-B76F-4C9131F65344}"/>
+              </a:ext>
+            </a:extLst>
+          </p:cNvPr>
+          <p:cNvSpPr/>
+          <p:nvPr/>
+        </p:nvSpPr>
+        <p:spPr>
+          <a:xfrm>
+            <a:off x="4138448" y="3374506"/>
+            <a:ext cx="867104" cy="677918"/>
+          </a:xfrm>
+          <a:prstGeom prst="rect">
+            <a:avLst/>
+          </a:prstGeom>
+          <a:solidFill>
+            <a:srgbClr val="00B050"/>
+          </a:solidFill>
+          <a:ln>
+            <a:noFill/>
+          </a:ln>
+        </p:spPr>
+        <p:style>
+          <a:lnRef idx="2">
+            <a:schemeClr val="accent1">
+              <a:shade val="50000"/>
+            </a:schemeClr>
+          </a:lnRef>
+          <a:fillRef idx="1">
+            <a:schemeClr val="accent1"/>
+          </a:fillRef>
+          <a:effectRef idx="0">
+            <a:schemeClr val="accent1"/>
+          </a:effectRef>
+          <a:fontRef idx="minor">
+            <a:schemeClr val="lt1"/>
+          </a:fontRef>
+        </p:style>
+        <p:txBody>
+          <a:bodyPr rtlCol="0" anchor="ctr"/>
+          <a:lstStyle/>
+          <a:p>
+            <a:pPr algn="ctr"/>
+            <a:r>
+              <a:rPr lang="en-US" sz="3200" dirty="0"/>
+              <a:t>+2</a:t>
+            </a:r>
+          </a:p>
+        </p:txBody>
+      </p:sp>
     </p:spTree>
     <p:extLst>
       <p:ext uri="{BB962C8B-B14F-4D97-AF65-F5344CB8AC3E}">
@@ -11193,7 +11193,7 @@
           <a:p>
             <a:fld id="{6700A58B-DD98-43D0-B791-721480A02982}" type="datetime1">
               <a:rPr lang="en-US" smtClean="0"/>
-              <a:t>1/30/23</a:t>
+              <a:t>2/8/23</a:t>
             </a:fld>
             <a:endParaRPr lang="en-US"/>
           </a:p>
@@ -11304,15 +11304,7 @@
             </a:pPr>
             <a:r>
               <a:rPr lang="en-US" sz="3200" dirty="0"/>
-              <a:t>I like shopping at </a:t>
-            </a:r>
-            <a:r>
-              <a:rPr lang="en-US" sz="3200" dirty="0" err="1"/>
-              <a:t>Migros</a:t>
-            </a:r>
-            <a:r>
-              <a:rPr lang="en-US" sz="3200" dirty="0"/>
-              <a:t> but hate the location. </a:t>
+              <a:t>I like NC State but hate the location. </a:t>
             </a:r>
           </a:p>
         </p:txBody>
@@ -12022,7 +12014,7 @@
           <a:p>
             <a:fld id="{6700A58B-DD98-43D0-B791-721480A02982}" type="datetime1">
               <a:rPr lang="en-US" smtClean="0"/>
-              <a:t>1/30/23</a:t>
+              <a:t>2/8/23</a:t>
             </a:fld>
             <a:endParaRPr lang="en-US"/>
           </a:p>
@@ -12137,7 +12129,7 @@
             </a:r>
             <a:r>
               <a:rPr lang="en-US" sz="3200" dirty="0"/>
-              <a:t> Aldi.</a:t>
+              <a:t> Duke.</a:t>
             </a:r>
           </a:p>
           <a:p>
@@ -12173,7 +12165,7 @@
             </a:r>
             <a:r>
               <a:rPr lang="en-US" sz="3200" dirty="0"/>
-              <a:t> Carrefour.  They are the </a:t>
+              <a:t> UNC.  They are the </a:t>
             </a:r>
             <a:r>
               <a:rPr lang="en-US" sz="3200" dirty="0">
@@ -12214,15 +12206,7 @@
             </a:r>
             <a:r>
               <a:rPr lang="en-US" sz="3200" dirty="0"/>
-              <a:t> shopping at </a:t>
-            </a:r>
-            <a:r>
-              <a:rPr lang="en-US" sz="3200" dirty="0" err="1"/>
-              <a:t>Migros</a:t>
-            </a:r>
-            <a:r>
-              <a:rPr lang="en-US" sz="3200" dirty="0"/>
-              <a:t> but </a:t>
+              <a:t> NC State but </a:t>
             </a:r>
             <a:r>
               <a:rPr lang="en-US" sz="3200" dirty="0">

</xml_diff>